<commit_message>
Enrichissement PPT et scripts de tests
</commit_message>
<xml_diff>
--- a/Présentation CUBE 2.pptx
+++ b/Présentation CUBE 2.pptx
@@ -10,14 +10,14 @@
   <p:sldIdLst>
     <p:sldId id="256" r:id="rId2"/>
     <p:sldId id="258" r:id="rId3"/>
-    <p:sldId id="261" r:id="rId4"/>
-    <p:sldId id="259" r:id="rId5"/>
-    <p:sldId id="260" r:id="rId6"/>
+    <p:sldId id="259" r:id="rId4"/>
+    <p:sldId id="260" r:id="rId5"/>
+    <p:sldId id="261" r:id="rId6"/>
     <p:sldId id="262" r:id="rId7"/>
     <p:sldId id="263" r:id="rId8"/>
-    <p:sldId id="264" r:id="rId9"/>
-    <p:sldId id="265" r:id="rId10"/>
-    <p:sldId id="266" r:id="rId11"/>
+    <p:sldId id="266" r:id="rId9"/>
+    <p:sldId id="264" r:id="rId10"/>
+    <p:sldId id="265" r:id="rId11"/>
   </p:sldIdLst>
   <p:sldSz cx="12192000" cy="6858000"/>
   <p:notesSz cx="6858000" cy="9144000"/>
@@ -127,6 +127,7 @@
 <file path=ppt/revisionInfo.xml><?xml version="1.0" encoding="utf-8"?>
 <p1510:revInfo xmlns:a="http://schemas.openxmlformats.org/drawingml/2006/main" xmlns:r="http://schemas.openxmlformats.org/officeDocument/2006/relationships" xmlns:p1510="http://schemas.microsoft.com/office/powerpoint/2015/10/main">
   <p1510:revLst>
+    <p1510:client id="{E410CC85-CE06-492B-ABD1-1BF9FA65696E}" v="3" dt="2023-03-14T15:55:33.625"/>
     <p1510:client id="{E8D26D28-C69B-4783-B1CB-C66F82A2FF9C}" v="9" dt="2023-03-14T10:39:08.947"/>
   </p1510:revLst>
 </p1510:revInfo>
@@ -134,6 +135,191 @@
 
 <file path=ppt/changesInfos/changesInfo1.xml><?xml version="1.0" encoding="utf-8"?>
 <pc:chgInfo xmlns:a="http://schemas.openxmlformats.org/drawingml/2006/main" xmlns:r="http://schemas.openxmlformats.org/officeDocument/2006/relationships" xmlns:ac="http://schemas.microsoft.com/office/drawing/2013/main/command" xmlns:pc="http://schemas.microsoft.com/office/powerpoint/2013/main/command">
+  <pc:docChgLst>
+    <pc:chgData name="Adeline Fernandez" userId="dab5bb2eb88bd76e" providerId="LiveId" clId="{E410CC85-CE06-492B-ABD1-1BF9FA65696E}"/>
+    <pc:docChg chg="undo custSel modSld sldOrd">
+      <pc:chgData name="Adeline Fernandez" userId="dab5bb2eb88bd76e" providerId="LiveId" clId="{E410CC85-CE06-492B-ABD1-1BF9FA65696E}" dt="2023-03-14T16:12:13.743" v="350" actId="20577"/>
+      <pc:docMkLst>
+        <pc:docMk/>
+      </pc:docMkLst>
+      <pc:sldChg chg="modSp mod">
+        <pc:chgData name="Adeline Fernandez" userId="dab5bb2eb88bd76e" providerId="LiveId" clId="{E410CC85-CE06-492B-ABD1-1BF9FA65696E}" dt="2023-03-14T14:50:41.595" v="1" actId="20577"/>
+        <pc:sldMkLst>
+          <pc:docMk/>
+          <pc:sldMk cId="495421651" sldId="258"/>
+        </pc:sldMkLst>
+        <pc:spChg chg="mod">
+          <ac:chgData name="Adeline Fernandez" userId="dab5bb2eb88bd76e" providerId="LiveId" clId="{E410CC85-CE06-492B-ABD1-1BF9FA65696E}" dt="2023-03-14T14:50:41.595" v="1" actId="20577"/>
+          <ac:spMkLst>
+            <pc:docMk/>
+            <pc:sldMk cId="495421651" sldId="258"/>
+            <ac:spMk id="3" creationId="{BBD81D5C-493E-78B1-6616-F151FFE650EA}"/>
+          </ac:spMkLst>
+        </pc:spChg>
+      </pc:sldChg>
+      <pc:sldChg chg="addSp delSp modSp mod ord">
+        <pc:chgData name="Adeline Fernandez" userId="dab5bb2eb88bd76e" providerId="LiveId" clId="{E410CC85-CE06-492B-ABD1-1BF9FA65696E}" dt="2023-03-14T15:57:41.007" v="104" actId="1076"/>
+        <pc:sldMkLst>
+          <pc:docMk/>
+          <pc:sldMk cId="1182368662" sldId="259"/>
+        </pc:sldMkLst>
+        <pc:spChg chg="del mod">
+          <ac:chgData name="Adeline Fernandez" userId="dab5bb2eb88bd76e" providerId="LiveId" clId="{E410CC85-CE06-492B-ABD1-1BF9FA65696E}" dt="2023-03-14T15:34:52.464" v="83" actId="478"/>
+          <ac:spMkLst>
+            <pc:docMk/>
+            <pc:sldMk cId="1182368662" sldId="259"/>
+            <ac:spMk id="3" creationId="{BBD81D5C-493E-78B1-6616-F151FFE650EA}"/>
+          </ac:spMkLst>
+        </pc:spChg>
+        <pc:spChg chg="add del mod">
+          <ac:chgData name="Adeline Fernandez" userId="dab5bb2eb88bd76e" providerId="LiveId" clId="{E410CC85-CE06-492B-ABD1-1BF9FA65696E}" dt="2023-03-14T15:57:26.473" v="97" actId="478"/>
+          <ac:spMkLst>
+            <pc:docMk/>
+            <pc:sldMk cId="1182368662" sldId="259"/>
+            <ac:spMk id="10" creationId="{BA489AB2-FD64-74F4-F3A8-BDB580FD41F9}"/>
+          </ac:spMkLst>
+        </pc:spChg>
+        <pc:picChg chg="mod">
+          <ac:chgData name="Adeline Fernandez" userId="dab5bb2eb88bd76e" providerId="LiveId" clId="{E410CC85-CE06-492B-ABD1-1BF9FA65696E}" dt="2023-03-14T14:59:16.325" v="7" actId="1076"/>
+          <ac:picMkLst>
+            <pc:docMk/>
+            <pc:sldMk cId="1182368662" sldId="259"/>
+            <ac:picMk id="5" creationId="{E6742EDC-E73E-6ACD-B581-F4706B466BBB}"/>
+          </ac:picMkLst>
+        </pc:picChg>
+        <pc:picChg chg="add mod">
+          <ac:chgData name="Adeline Fernandez" userId="dab5bb2eb88bd76e" providerId="LiveId" clId="{E410CC85-CE06-492B-ABD1-1BF9FA65696E}" dt="2023-03-14T15:57:41.007" v="104" actId="1076"/>
+          <ac:picMkLst>
+            <pc:docMk/>
+            <pc:sldMk cId="1182368662" sldId="259"/>
+            <ac:picMk id="7" creationId="{BD2F5658-7F7E-34D3-03F6-923D987D50E5}"/>
+          </ac:picMkLst>
+        </pc:picChg>
+        <pc:picChg chg="add del mod">
+          <ac:chgData name="Adeline Fernandez" userId="dab5bb2eb88bd76e" providerId="LiveId" clId="{E410CC85-CE06-492B-ABD1-1BF9FA65696E}" dt="2023-03-14T15:57:25.736" v="96" actId="478"/>
+          <ac:picMkLst>
+            <pc:docMk/>
+            <pc:sldMk cId="1182368662" sldId="259"/>
+            <ac:picMk id="9" creationId="{AFA4C690-0446-1273-61E4-562AAA1F6AAC}"/>
+          </ac:picMkLst>
+        </pc:picChg>
+      </pc:sldChg>
+      <pc:sldChg chg="addSp delSp modSp mod ord">
+        <pc:chgData name="Adeline Fernandez" userId="dab5bb2eb88bd76e" providerId="LiveId" clId="{E410CC85-CE06-492B-ABD1-1BF9FA65696E}" dt="2023-03-14T15:57:36.679" v="102" actId="1076"/>
+        <pc:sldMkLst>
+          <pc:docMk/>
+          <pc:sldMk cId="2708360123" sldId="260"/>
+        </pc:sldMkLst>
+        <pc:spChg chg="del mod">
+          <ac:chgData name="Adeline Fernandez" userId="dab5bb2eb88bd76e" providerId="LiveId" clId="{E410CC85-CE06-492B-ABD1-1BF9FA65696E}" dt="2023-03-14T15:55:46.174" v="95" actId="478"/>
+          <ac:spMkLst>
+            <pc:docMk/>
+            <pc:sldMk cId="2708360123" sldId="260"/>
+            <ac:spMk id="3" creationId="{BBD81D5C-493E-78B1-6616-F151FFE650EA}"/>
+          </ac:spMkLst>
+        </pc:spChg>
+        <pc:picChg chg="add mod">
+          <ac:chgData name="Adeline Fernandez" userId="dab5bb2eb88bd76e" providerId="LiveId" clId="{E410CC85-CE06-492B-ABD1-1BF9FA65696E}" dt="2023-03-14T15:57:36.679" v="102" actId="1076"/>
+          <ac:picMkLst>
+            <pc:docMk/>
+            <pc:sldMk cId="2708360123" sldId="260"/>
+            <ac:picMk id="7" creationId="{09B34FDF-DA7D-BBDB-69A2-D0D8363A286D}"/>
+          </ac:picMkLst>
+        </pc:picChg>
+      </pc:sldChg>
+      <pc:sldChg chg="modSp mod">
+        <pc:chgData name="Adeline Fernandez" userId="dab5bb2eb88bd76e" providerId="LiveId" clId="{E410CC85-CE06-492B-ABD1-1BF9FA65696E}" dt="2023-03-14T16:05:40.708" v="247" actId="120"/>
+        <pc:sldMkLst>
+          <pc:docMk/>
+          <pc:sldMk cId="3762045951" sldId="261"/>
+        </pc:sldMkLst>
+        <pc:spChg chg="mod">
+          <ac:chgData name="Adeline Fernandez" userId="dab5bb2eb88bd76e" providerId="LiveId" clId="{E410CC85-CE06-492B-ABD1-1BF9FA65696E}" dt="2023-03-14T16:05:40.708" v="247" actId="120"/>
+          <ac:spMkLst>
+            <pc:docMk/>
+            <pc:sldMk cId="3762045951" sldId="261"/>
+            <ac:spMk id="3" creationId="{BBD81D5C-493E-78B1-6616-F151FFE650EA}"/>
+          </ac:spMkLst>
+        </pc:spChg>
+        <pc:picChg chg="mod">
+          <ac:chgData name="Adeline Fernandez" userId="dab5bb2eb88bd76e" providerId="LiveId" clId="{E410CC85-CE06-492B-ABD1-1BF9FA65696E}" dt="2023-03-14T16:05:32.544" v="244" actId="1076"/>
+          <ac:picMkLst>
+            <pc:docMk/>
+            <pc:sldMk cId="3762045951" sldId="261"/>
+            <ac:picMk id="5" creationId="{E6742EDC-E73E-6ACD-B581-F4706B466BBB}"/>
+          </ac:picMkLst>
+        </pc:picChg>
+      </pc:sldChg>
+      <pc:sldChg chg="modSp mod">
+        <pc:chgData name="Adeline Fernandez" userId="dab5bb2eb88bd76e" providerId="LiveId" clId="{E410CC85-CE06-492B-ABD1-1BF9FA65696E}" dt="2023-03-14T16:06:59.916" v="295" actId="20577"/>
+        <pc:sldMkLst>
+          <pc:docMk/>
+          <pc:sldMk cId="2621285410" sldId="262"/>
+        </pc:sldMkLst>
+        <pc:spChg chg="mod">
+          <ac:chgData name="Adeline Fernandez" userId="dab5bb2eb88bd76e" providerId="LiveId" clId="{E410CC85-CE06-492B-ABD1-1BF9FA65696E}" dt="2023-03-14T16:06:59.916" v="295" actId="20577"/>
+          <ac:spMkLst>
+            <pc:docMk/>
+            <pc:sldMk cId="2621285410" sldId="262"/>
+            <ac:spMk id="3" creationId="{BBD81D5C-493E-78B1-6616-F151FFE650EA}"/>
+          </ac:spMkLst>
+        </pc:spChg>
+        <pc:picChg chg="mod">
+          <ac:chgData name="Adeline Fernandez" userId="dab5bb2eb88bd76e" providerId="LiveId" clId="{E410CC85-CE06-492B-ABD1-1BF9FA65696E}" dt="2023-03-14T16:06:13.575" v="250" actId="1076"/>
+          <ac:picMkLst>
+            <pc:docMk/>
+            <pc:sldMk cId="2621285410" sldId="262"/>
+            <ac:picMk id="5" creationId="{E6742EDC-E73E-6ACD-B581-F4706B466BBB}"/>
+          </ac:picMkLst>
+        </pc:picChg>
+      </pc:sldChg>
+      <pc:sldChg chg="modSp mod">
+        <pc:chgData name="Adeline Fernandez" userId="dab5bb2eb88bd76e" providerId="LiveId" clId="{E410CC85-CE06-492B-ABD1-1BF9FA65696E}" dt="2023-03-14T16:07:21.302" v="296" actId="120"/>
+        <pc:sldMkLst>
+          <pc:docMk/>
+          <pc:sldMk cId="2168826528" sldId="263"/>
+        </pc:sldMkLst>
+        <pc:spChg chg="mod">
+          <ac:chgData name="Adeline Fernandez" userId="dab5bb2eb88bd76e" providerId="LiveId" clId="{E410CC85-CE06-492B-ABD1-1BF9FA65696E}" dt="2023-03-14T16:07:21.302" v="296" actId="120"/>
+          <ac:spMkLst>
+            <pc:docMk/>
+            <pc:sldMk cId="2168826528" sldId="263"/>
+            <ac:spMk id="3" creationId="{BBD81D5C-493E-78B1-6616-F151FFE650EA}"/>
+          </ac:spMkLst>
+        </pc:spChg>
+      </pc:sldChg>
+      <pc:sldChg chg="modSp mod">
+        <pc:chgData name="Adeline Fernandez" userId="dab5bb2eb88bd76e" providerId="LiveId" clId="{E410CC85-CE06-492B-ABD1-1BF9FA65696E}" dt="2023-03-14T16:12:13.743" v="350" actId="20577"/>
+        <pc:sldMkLst>
+          <pc:docMk/>
+          <pc:sldMk cId="2184707159" sldId="265"/>
+        </pc:sldMkLst>
+        <pc:spChg chg="mod">
+          <ac:chgData name="Adeline Fernandez" userId="dab5bb2eb88bd76e" providerId="LiveId" clId="{E410CC85-CE06-492B-ABD1-1BF9FA65696E}" dt="2023-03-14T16:12:02.377" v="310" actId="20577"/>
+          <ac:spMkLst>
+            <pc:docMk/>
+            <pc:sldMk cId="2184707159" sldId="265"/>
+            <ac:spMk id="2" creationId="{8AAC8793-2459-E680-2673-DA71B6BD3198}"/>
+          </ac:spMkLst>
+        </pc:spChg>
+        <pc:spChg chg="mod">
+          <ac:chgData name="Adeline Fernandez" userId="dab5bb2eb88bd76e" providerId="LiveId" clId="{E410CC85-CE06-492B-ABD1-1BF9FA65696E}" dt="2023-03-14T16:12:13.743" v="350" actId="20577"/>
+          <ac:spMkLst>
+            <pc:docMk/>
+            <pc:sldMk cId="2184707159" sldId="265"/>
+            <ac:spMk id="3" creationId="{BBD81D5C-493E-78B1-6616-F151FFE650EA}"/>
+          </ac:spMkLst>
+        </pc:spChg>
+      </pc:sldChg>
+      <pc:sldChg chg="ord">
+        <pc:chgData name="Adeline Fernandez" userId="dab5bb2eb88bd76e" providerId="LiveId" clId="{E410CC85-CE06-492B-ABD1-1BF9FA65696E}" dt="2023-03-14T16:11:10.336" v="298"/>
+        <pc:sldMkLst>
+          <pc:docMk/>
+          <pc:sldMk cId="230450834" sldId="266"/>
+        </pc:sldMkLst>
+      </pc:sldChg>
+    </pc:docChg>
+  </pc:docChgLst>
   <pc:docChgLst>
     <pc:chgData name="Adeline Fernandez" userId="dab5bb2eb88bd76e" providerId="LiveId" clId="{E8D26D28-C69B-4783-B1CB-C66F82A2FF9C}"/>
     <pc:docChg chg="undo custSel modSld sldOrd">
@@ -5449,12 +5635,12 @@
         <p:spPr>
           <a:xfrm>
             <a:off x="2179865" y="412818"/>
-            <a:ext cx="7810500" cy="1063557"/>
+            <a:ext cx="7810500" cy="1476365"/>
           </a:xfrm>
         </p:spPr>
         <p:txBody>
           <a:bodyPr anchor="b">
-            <a:normAutofit/>
+            <a:noAutofit/>
           </a:bodyPr>
           <a:lstStyle/>
           <a:p>
@@ -5462,7 +5648,7 @@
               <a:rPr lang="fr-FR" dirty="0">
                 <a:latin typeface="Amasis MT Pro Medium" panose="02040604050005020304" pitchFamily="18" charset="0"/>
               </a:rPr>
-              <a:t>Evolutions envisagées</a:t>
+              <a:t>Bilan final </a:t>
             </a:r>
             <a:endParaRPr lang="fr-FR" dirty="0"/>
           </a:p>
@@ -5486,8 +5672,8 @@
         </p:nvSpPr>
         <p:spPr>
           <a:xfrm>
-            <a:off x="2619375" y="1889183"/>
-            <a:ext cx="6953250" cy="3749617"/>
+            <a:off x="2619375" y="2152650"/>
+            <a:ext cx="6953250" cy="3486150"/>
           </a:xfrm>
         </p:spPr>
         <p:txBody>
@@ -5502,7 +5688,7 @@
             </a:pPr>
             <a:r>
               <a:rPr lang="fr-FR" dirty="0"/>
-              <a:t>Amélioration du visuel</a:t>
+              <a:t>Difficultés rencontrées</a:t>
             </a:r>
           </a:p>
           <a:p>
@@ -5512,7 +5698,7 @@
             </a:pPr>
             <a:r>
               <a:rPr lang="fr-FR" dirty="0"/>
-              <a:t>Intégration de nouvelles pages pour les besoins des utilisateurs : graphes, prévisions météo</a:t>
+              <a:t>Solutions </a:t>
             </a:r>
           </a:p>
           <a:p>
@@ -5529,7 +5715,7 @@
           <p:cNvPr id="6" name="Espace réservé du numéro de diapositive 5">
             <a:extLst>
               <a:ext uri="{FF2B5EF4-FFF2-40B4-BE49-F238E27FC236}">
-                <a16:creationId xmlns:a16="http://schemas.microsoft.com/office/drawing/2014/main" id="{849CACCF-2FD1-DF9D-B527-0FAE9FCE1B5D}"/>
+                <a16:creationId xmlns:a16="http://schemas.microsoft.com/office/drawing/2014/main" id="{C8FF65BA-EF36-A08A-A9D9-177DBD2CD342}"/>
               </a:ext>
             </a:extLst>
           </p:cNvPr>
@@ -5556,7 +5742,7 @@
     </p:spTree>
     <p:extLst>
       <p:ext uri="{BB962C8B-B14F-4D97-AF65-F5344CB8AC3E}">
-        <p14:creationId xmlns:p14="http://schemas.microsoft.com/office/powerpoint/2010/main" val="230450834"/>
+        <p14:creationId xmlns:p14="http://schemas.microsoft.com/office/powerpoint/2010/main" val="2184707159"/>
       </p:ext>
     </p:extLst>
   </p:cSld>
@@ -7133,7 +7319,7 @@
         </p:blipFill>
         <p:spPr>
           <a:xfrm>
-            <a:off x="1524" y="10"/>
+            <a:off x="3048" y="-35592"/>
             <a:ext cx="12188952" cy="6857990"/>
           </a:xfrm>
           <a:prstGeom prst="rect">
@@ -8186,12 +8372,12 @@
         <p:spPr>
           <a:xfrm>
             <a:off x="2179865" y="412818"/>
-            <a:ext cx="7810500" cy="1063557"/>
+            <a:ext cx="7810500" cy="1577907"/>
           </a:xfrm>
         </p:spPr>
         <p:txBody>
           <a:bodyPr anchor="b">
-            <a:normAutofit/>
+            <a:noAutofit/>
           </a:bodyPr>
           <a:lstStyle/>
           <a:p>
@@ -8199,40 +8385,8 @@
               <a:rPr lang="fr-FR" dirty="0">
                 <a:latin typeface="Amasis MT Pro Medium" panose="02040604050005020304" pitchFamily="18" charset="0"/>
               </a:rPr>
-              <a:t>Base de données</a:t>
+              <a:t>Communication capteur et Raspberry</a:t>
             </a:r>
-            <a:endParaRPr lang="fr-FR" dirty="0"/>
-          </a:p>
-        </p:txBody>
-      </p:sp>
-      <p:sp>
-        <p:nvSpPr>
-          <p:cNvPr id="3" name="Sous-titre 2">
-            <a:extLst>
-              <a:ext uri="{FF2B5EF4-FFF2-40B4-BE49-F238E27FC236}">
-                <a16:creationId xmlns:a16="http://schemas.microsoft.com/office/drawing/2014/main" id="{BBD81D5C-493E-78B1-6616-F151FFE650EA}"/>
-              </a:ext>
-            </a:extLst>
-          </p:cNvPr>
-          <p:cNvSpPr>
-            <a:spLocks noGrp="1"/>
-          </p:cNvSpPr>
-          <p:nvPr>
-            <p:ph type="subTitle" idx="1"/>
-          </p:nvPr>
-        </p:nvSpPr>
-        <p:spPr>
-          <a:xfrm>
-            <a:off x="2619375" y="1889183"/>
-            <a:ext cx="6953250" cy="3749617"/>
-          </a:xfrm>
-        </p:spPr>
-        <p:txBody>
-          <a:bodyPr anchor="t">
-            <a:normAutofit/>
-          </a:bodyPr>
-          <a:lstStyle/>
-          <a:p>
             <a:endParaRPr lang="fr-FR" dirty="0"/>
           </a:p>
         </p:txBody>
@@ -8242,7 +8396,7 @@
           <p:cNvPr id="6" name="Espace réservé du numéro de diapositive 5">
             <a:extLst>
               <a:ext uri="{FF2B5EF4-FFF2-40B4-BE49-F238E27FC236}">
-                <a16:creationId xmlns:a16="http://schemas.microsoft.com/office/drawing/2014/main" id="{ABEFB1D2-ECFD-5CF6-793C-D3B747186552}"/>
+                <a16:creationId xmlns:a16="http://schemas.microsoft.com/office/drawing/2014/main" id="{1F3651D4-649B-00B4-9597-409742533F3A}"/>
               </a:ext>
             </a:extLst>
           </p:cNvPr>
@@ -8266,10 +8420,46 @@
           </a:p>
         </p:txBody>
       </p:sp>
+      <p:pic>
+        <p:nvPicPr>
+          <p:cNvPr id="7" name="Image 6" descr="Une image contenant texte&#10;&#10;Description générée automatiquement">
+            <a:extLst>
+              <a:ext uri="{FF2B5EF4-FFF2-40B4-BE49-F238E27FC236}">
+                <a16:creationId xmlns:a16="http://schemas.microsoft.com/office/drawing/2014/main" id="{BD2F5658-7F7E-34D3-03F6-923D987D50E5}"/>
+              </a:ext>
+            </a:extLst>
+          </p:cNvPr>
+          <p:cNvPicPr>
+            <a:picLocks noChangeAspect="1"/>
+          </p:cNvPicPr>
+          <p:nvPr/>
+        </p:nvPicPr>
+        <p:blipFill>
+          <a:blip r:embed="rId3">
+            <a:extLst>
+              <a:ext uri="{28A0092B-C50C-407E-A947-70E740481C1C}">
+                <a14:useLocalDpi xmlns:a14="http://schemas.microsoft.com/office/drawing/2010/main" val="0"/>
+              </a:ext>
+            </a:extLst>
+          </a:blip>
+          <a:stretch>
+            <a:fillRect/>
+          </a:stretch>
+        </p:blipFill>
+        <p:spPr>
+          <a:xfrm>
+            <a:off x="2511490" y="2453073"/>
+            <a:ext cx="7508263" cy="3291869"/>
+          </a:xfrm>
+          <a:prstGeom prst="rect">
+            <a:avLst/>
+          </a:prstGeom>
+        </p:spPr>
+      </p:pic>
     </p:spTree>
     <p:extLst>
       <p:ext uri="{BB962C8B-B14F-4D97-AF65-F5344CB8AC3E}">
-        <p14:creationId xmlns:p14="http://schemas.microsoft.com/office/powerpoint/2010/main" val="3762045951"/>
+        <p14:creationId xmlns:p14="http://schemas.microsoft.com/office/powerpoint/2010/main" val="1182368662"/>
       </p:ext>
     </p:extLst>
   </p:cSld>
@@ -8420,7 +8610,7 @@
         </p:blipFill>
         <p:spPr>
           <a:xfrm>
-            <a:off x="3048" y="-35592"/>
+            <a:off x="1524" y="10"/>
             <a:ext cx="12188952" cy="6857990"/>
           </a:xfrm>
           <a:prstGeom prst="rect">
@@ -9473,7 +9663,7 @@
         <p:spPr>
           <a:xfrm>
             <a:off x="2179865" y="412818"/>
-            <a:ext cx="7810500" cy="1577907"/>
+            <a:ext cx="7810500" cy="1440763"/>
           </a:xfrm>
         </p:spPr>
         <p:txBody>
@@ -9486,58 +9676,9 @@
               <a:rPr lang="fr-FR" dirty="0">
                 <a:latin typeface="Amasis MT Pro Medium" panose="02040604050005020304" pitchFamily="18" charset="0"/>
               </a:rPr>
-              <a:t>Communication capteur et Raspberry</a:t>
+              <a:t>Interrogation API externe</a:t>
             </a:r>
             <a:endParaRPr lang="fr-FR" dirty="0"/>
-          </a:p>
-        </p:txBody>
-      </p:sp>
-      <p:sp>
-        <p:nvSpPr>
-          <p:cNvPr id="3" name="Sous-titre 2">
-            <a:extLst>
-              <a:ext uri="{FF2B5EF4-FFF2-40B4-BE49-F238E27FC236}">
-                <a16:creationId xmlns:a16="http://schemas.microsoft.com/office/drawing/2014/main" id="{BBD81D5C-493E-78B1-6616-F151FFE650EA}"/>
-              </a:ext>
-            </a:extLst>
-          </p:cNvPr>
-          <p:cNvSpPr>
-            <a:spLocks noGrp="1"/>
-          </p:cNvSpPr>
-          <p:nvPr>
-            <p:ph type="subTitle" idx="1"/>
-          </p:nvPr>
-        </p:nvSpPr>
-        <p:spPr>
-          <a:xfrm>
-            <a:off x="2619375" y="2238375"/>
-            <a:ext cx="6953250" cy="3400425"/>
-          </a:xfrm>
-        </p:spPr>
-        <p:txBody>
-          <a:bodyPr anchor="t">
-            <a:normAutofit/>
-          </a:bodyPr>
-          <a:lstStyle/>
-          <a:p>
-            <a:pPr marL="342900" indent="-342900">
-              <a:buFontTx/>
-              <a:buChar char="-"/>
-            </a:pPr>
-            <a:r>
-              <a:rPr lang="fr-FR" dirty="0"/>
-              <a:t>Script récupération de données</a:t>
-            </a:r>
-          </a:p>
-          <a:p>
-            <a:pPr marL="342900" indent="-342900">
-              <a:buFontTx/>
-              <a:buChar char="-"/>
-            </a:pPr>
-            <a:r>
-              <a:rPr lang="fr-FR" dirty="0"/>
-              <a:t>Affichage sur LCD</a:t>
-            </a:r>
           </a:p>
         </p:txBody>
       </p:sp>
@@ -9546,7 +9687,7 @@
           <p:cNvPr id="6" name="Espace réservé du numéro de diapositive 5">
             <a:extLst>
               <a:ext uri="{FF2B5EF4-FFF2-40B4-BE49-F238E27FC236}">
-                <a16:creationId xmlns:a16="http://schemas.microsoft.com/office/drawing/2014/main" id="{1F3651D4-649B-00B4-9597-409742533F3A}"/>
+                <a16:creationId xmlns:a16="http://schemas.microsoft.com/office/drawing/2014/main" id="{36912A81-08FF-F10B-AD81-4144DA0BF4CB}"/>
               </a:ext>
             </a:extLst>
           </p:cNvPr>
@@ -9570,10 +9711,46 @@
           </a:p>
         </p:txBody>
       </p:sp>
+      <p:pic>
+        <p:nvPicPr>
+          <p:cNvPr id="7" name="Image 6" descr="Une image contenant texte&#10;&#10;Description générée automatiquement">
+            <a:extLst>
+              <a:ext uri="{FF2B5EF4-FFF2-40B4-BE49-F238E27FC236}">
+                <a16:creationId xmlns:a16="http://schemas.microsoft.com/office/drawing/2014/main" id="{09B34FDF-DA7D-BBDB-69A2-D0D8363A286D}"/>
+              </a:ext>
+            </a:extLst>
+          </p:cNvPr>
+          <p:cNvPicPr>
+            <a:picLocks noChangeAspect="1"/>
+          </p:cNvPicPr>
+          <p:nvPr/>
+        </p:nvPicPr>
+        <p:blipFill>
+          <a:blip r:embed="rId3">
+            <a:extLst>
+              <a:ext uri="{28A0092B-C50C-407E-A947-70E740481C1C}">
+                <a14:useLocalDpi xmlns:a14="http://schemas.microsoft.com/office/drawing/2010/main" val="0"/>
+              </a:ext>
+            </a:extLst>
+          </a:blip>
+          <a:stretch>
+            <a:fillRect/>
+          </a:stretch>
+        </p:blipFill>
+        <p:spPr>
+          <a:xfrm>
+            <a:off x="1951834" y="2266389"/>
+            <a:ext cx="8697373" cy="3399693"/>
+          </a:xfrm>
+          <a:prstGeom prst="rect">
+            <a:avLst/>
+          </a:prstGeom>
+        </p:spPr>
+      </p:pic>
     </p:spTree>
     <p:extLst>
       <p:ext uri="{BB962C8B-B14F-4D97-AF65-F5344CB8AC3E}">
-        <p14:creationId xmlns:p14="http://schemas.microsoft.com/office/powerpoint/2010/main" val="1182368662"/>
+        <p14:creationId xmlns:p14="http://schemas.microsoft.com/office/powerpoint/2010/main" val="2708360123"/>
       </p:ext>
     </p:extLst>
   </p:cSld>
@@ -10777,12 +10954,12 @@
         <p:spPr>
           <a:xfrm>
             <a:off x="2179865" y="412818"/>
-            <a:ext cx="7810500" cy="1440763"/>
+            <a:ext cx="7810500" cy="1063557"/>
           </a:xfrm>
         </p:spPr>
         <p:txBody>
           <a:bodyPr anchor="b">
-            <a:noAutofit/>
+            <a:normAutofit/>
           </a:bodyPr>
           <a:lstStyle/>
           <a:p>
@@ -10790,7 +10967,7 @@
               <a:rPr lang="fr-FR" dirty="0">
                 <a:latin typeface="Amasis MT Pro Medium" panose="02040604050005020304" pitchFamily="18" charset="0"/>
               </a:rPr>
-              <a:t>Interrogation API externe</a:t>
+              <a:t>Base de données</a:t>
             </a:r>
             <a:endParaRPr lang="fr-FR" dirty="0"/>
           </a:p>
@@ -10814,8 +10991,8 @@
         </p:nvSpPr>
         <p:spPr>
           <a:xfrm>
-            <a:off x="2619375" y="2019300"/>
-            <a:ext cx="6953250" cy="3619500"/>
+            <a:off x="3194995" y="2389707"/>
+            <a:ext cx="6012995" cy="1184987"/>
           </a:xfrm>
         </p:spPr>
         <p:txBody>
@@ -10824,24 +11001,31 @@
           </a:bodyPr>
           <a:lstStyle/>
           <a:p>
-            <a:pPr marL="342900" indent="-342900">
+            <a:pPr marL="342900" indent="-342900" algn="l">
               <a:buFontTx/>
               <a:buChar char="-"/>
             </a:pPr>
             <a:r>
               <a:rPr lang="fr-FR" dirty="0"/>
-              <a:t>Création d’une clé API</a:t>
+              <a:t>Création d’une base</a:t>
             </a:r>
           </a:p>
           <a:p>
-            <a:pPr marL="342900" indent="-342900">
+            <a:pPr marL="342900" indent="-342900" algn="l">
               <a:buFontTx/>
               <a:buChar char="-"/>
             </a:pPr>
             <a:r>
               <a:rPr lang="fr-FR" dirty="0"/>
-              <a:t>Scripts</a:t>
+              <a:t>Création d’une table </a:t>
             </a:r>
+          </a:p>
+          <a:p>
+            <a:pPr marL="342900" indent="-342900" algn="l">
+              <a:buFontTx/>
+              <a:buChar char="-"/>
+            </a:pPr>
+            <a:endParaRPr lang="fr-FR" dirty="0"/>
           </a:p>
         </p:txBody>
       </p:sp>
@@ -10850,7 +11034,7 @@
           <p:cNvPr id="6" name="Espace réservé du numéro de diapositive 5">
             <a:extLst>
               <a:ext uri="{FF2B5EF4-FFF2-40B4-BE49-F238E27FC236}">
-                <a16:creationId xmlns:a16="http://schemas.microsoft.com/office/drawing/2014/main" id="{36912A81-08FF-F10B-AD81-4144DA0BF4CB}"/>
+                <a16:creationId xmlns:a16="http://schemas.microsoft.com/office/drawing/2014/main" id="{ABEFB1D2-ECFD-5CF6-793C-D3B747186552}"/>
               </a:ext>
             </a:extLst>
           </p:cNvPr>
@@ -10877,7 +11061,7 @@
     </p:spTree>
     <p:extLst>
       <p:ext uri="{BB962C8B-B14F-4D97-AF65-F5344CB8AC3E}">
-        <p14:creationId xmlns:p14="http://schemas.microsoft.com/office/powerpoint/2010/main" val="2708360123"/>
+        <p14:creationId xmlns:p14="http://schemas.microsoft.com/office/powerpoint/2010/main" val="3762045951"/>
       </p:ext>
     </p:extLst>
   </p:cSld>
@@ -11028,7 +11212,7 @@
         </p:blipFill>
         <p:spPr>
           <a:xfrm>
-            <a:off x="1524" y="10"/>
+            <a:off x="-9361" y="10"/>
             <a:ext cx="12188952" cy="6857990"/>
           </a:xfrm>
           <a:prstGeom prst="rect">
@@ -12124,21 +12308,21 @@
         </p:spPr>
         <p:txBody>
           <a:bodyPr anchor="t">
-            <a:normAutofit fontScale="92500" lnSpcReduction="20000"/>
+            <a:normAutofit lnSpcReduction="10000"/>
           </a:bodyPr>
           <a:lstStyle/>
           <a:p>
-            <a:pPr marL="342900" indent="-342900">
+            <a:pPr marL="342900" indent="-342900" algn="l">
               <a:buFontTx/>
               <a:buChar char="-"/>
             </a:pPr>
             <a:r>
               <a:rPr lang="fr-FR" dirty="0"/>
-              <a:t>Installation de modules nécessaires</a:t>
+              <a:t>Reprise des scripts de tests</a:t>
             </a:r>
           </a:p>
           <a:p>
-            <a:pPr marL="342900" indent="-342900">
+            <a:pPr marL="342900" indent="-342900" algn="l">
               <a:buFontTx/>
               <a:buChar char="-"/>
             </a:pPr>
@@ -12148,7 +12332,7 @@
             </a:r>
           </a:p>
           <a:p>
-            <a:pPr marL="342900" indent="-342900">
+            <a:pPr marL="342900" indent="-342900" algn="l">
               <a:buFontTx/>
               <a:buChar char="-"/>
             </a:pPr>
@@ -12158,17 +12342,7 @@
             </a:r>
           </a:p>
           <a:p>
-            <a:pPr marL="342900" indent="-342900">
-              <a:buFontTx/>
-              <a:buChar char="-"/>
-            </a:pPr>
-            <a:r>
-              <a:rPr lang="fr-FR" dirty="0"/>
-              <a:t>Initialisation du capteur/de l’API</a:t>
-            </a:r>
-          </a:p>
-          <a:p>
-            <a:pPr marL="342900" indent="-342900">
+            <a:pPr marL="342900" indent="-342900" algn="l">
               <a:buFontTx/>
               <a:buChar char="-"/>
             </a:pPr>
@@ -12178,7 +12352,7 @@
             </a:r>
           </a:p>
           <a:p>
-            <a:pPr marL="342900" indent="-342900">
+            <a:pPr marL="342900" indent="-342900" algn="l">
               <a:buFontTx/>
               <a:buChar char="-"/>
             </a:pPr>
@@ -12188,17 +12362,17 @@
             </a:r>
           </a:p>
           <a:p>
-            <a:pPr marL="342900" indent="-342900">
+            <a:pPr marL="342900" indent="-342900" algn="l">
               <a:buFontTx/>
               <a:buChar char="-"/>
             </a:pPr>
             <a:r>
               <a:rPr lang="fr-FR" dirty="0"/>
-              <a:t>Confirmation</a:t>
+              <a:t>Commit</a:t>
             </a:r>
           </a:p>
           <a:p>
-            <a:pPr marL="342900" indent="-342900">
+            <a:pPr marL="342900" indent="-342900" algn="l">
               <a:buFontTx/>
               <a:buChar char="-"/>
             </a:pPr>
@@ -12208,7 +12382,7 @@
             </a:r>
           </a:p>
           <a:p>
-            <a:pPr marL="342900" indent="-342900">
+            <a:pPr marL="342900" indent="-342900" algn="l">
               <a:buFontTx/>
               <a:buChar char="-"/>
             </a:pPr>
@@ -12218,7 +12392,7 @@
             </a:r>
             <a:r>
               <a:rPr lang="fr-FR" dirty="0"/>
-              <a:t> ???? </a:t>
+              <a:t> </a:t>
             </a:r>
           </a:p>
           <a:p>
@@ -13509,7 +13683,7 @@
           </a:bodyPr>
           <a:lstStyle/>
           <a:p>
-            <a:pPr marL="342900" indent="-342900">
+            <a:pPr marL="342900" indent="-342900" algn="l">
               <a:buFontTx/>
               <a:buChar char="-"/>
             </a:pPr>
@@ -13519,7 +13693,7 @@
             </a:r>
           </a:p>
           <a:p>
-            <a:pPr marL="342900" indent="-342900">
+            <a:pPr marL="342900" indent="-342900" algn="l">
               <a:buFontTx/>
               <a:buChar char="-"/>
             </a:pPr>
@@ -14779,7 +14953,7 @@
               <a:rPr lang="fr-FR" dirty="0">
                 <a:latin typeface="Amasis MT Pro Medium" panose="02040604050005020304" pitchFamily="18" charset="0"/>
               </a:rPr>
-              <a:t>Organisation d’équipe</a:t>
+              <a:t>Evolutions envisagées</a:t>
             </a:r>
             <a:endParaRPr lang="fr-FR" dirty="0"/>
           </a:p>
@@ -14813,6 +14987,30 @@
           </a:bodyPr>
           <a:lstStyle/>
           <a:p>
+            <a:pPr marL="342900" indent="-342900">
+              <a:buFontTx/>
+              <a:buChar char="-"/>
+            </a:pPr>
+            <a:r>
+              <a:rPr lang="fr-FR" dirty="0"/>
+              <a:t>Amélioration du visuel</a:t>
+            </a:r>
+          </a:p>
+          <a:p>
+            <a:pPr marL="342900" indent="-342900">
+              <a:buFontTx/>
+              <a:buChar char="-"/>
+            </a:pPr>
+            <a:r>
+              <a:rPr lang="fr-FR" dirty="0"/>
+              <a:t>Intégration de nouvelles pages pour les besoins des utilisateurs : graphes, prévisions météo</a:t>
+            </a:r>
+          </a:p>
+          <a:p>
+            <a:pPr marL="342900" indent="-342900">
+              <a:buFontTx/>
+              <a:buChar char="-"/>
+            </a:pPr>
             <a:endParaRPr lang="fr-FR" dirty="0"/>
           </a:p>
         </p:txBody>
@@ -14822,7 +15020,7 @@
           <p:cNvPr id="6" name="Espace réservé du numéro de diapositive 5">
             <a:extLst>
               <a:ext uri="{FF2B5EF4-FFF2-40B4-BE49-F238E27FC236}">
-                <a16:creationId xmlns:a16="http://schemas.microsoft.com/office/drawing/2014/main" id="{F8E500CC-BD43-E2CE-8E3F-24DF377B5919}"/>
+                <a16:creationId xmlns:a16="http://schemas.microsoft.com/office/drawing/2014/main" id="{849CACCF-2FD1-DF9D-B527-0FAE9FCE1B5D}"/>
               </a:ext>
             </a:extLst>
           </p:cNvPr>
@@ -14849,7 +15047,7 @@
     </p:spTree>
     <p:extLst>
       <p:ext uri="{BB962C8B-B14F-4D97-AF65-F5344CB8AC3E}">
-        <p14:creationId xmlns:p14="http://schemas.microsoft.com/office/powerpoint/2010/main" val="2180545974"/>
+        <p14:creationId xmlns:p14="http://schemas.microsoft.com/office/powerpoint/2010/main" val="230450834"/>
       </p:ext>
     </p:extLst>
   </p:cSld>
@@ -16053,12 +16251,12 @@
         <p:spPr>
           <a:xfrm>
             <a:off x="2179865" y="412818"/>
-            <a:ext cx="7810500" cy="1476365"/>
+            <a:ext cx="7810500" cy="1063557"/>
           </a:xfrm>
         </p:spPr>
         <p:txBody>
           <a:bodyPr anchor="b">
-            <a:noAutofit/>
+            <a:normAutofit/>
           </a:bodyPr>
           <a:lstStyle/>
           <a:p>
@@ -16066,7 +16264,7 @@
               <a:rPr lang="fr-FR" dirty="0">
                 <a:latin typeface="Amasis MT Pro Medium" panose="02040604050005020304" pitchFamily="18" charset="0"/>
               </a:rPr>
-              <a:t>Difficultés rencontrées</a:t>
+              <a:t>Organisation d’équipe</a:t>
             </a:r>
             <a:endParaRPr lang="fr-FR" dirty="0"/>
           </a:p>
@@ -16090,8 +16288,8 @@
         </p:nvSpPr>
         <p:spPr>
           <a:xfrm>
-            <a:off x="2619375" y="2152650"/>
-            <a:ext cx="6953250" cy="3486150"/>
+            <a:off x="2619375" y="1889183"/>
+            <a:ext cx="6953250" cy="3749617"/>
           </a:xfrm>
         </p:spPr>
         <p:txBody>
@@ -16100,30 +16298,6 @@
           </a:bodyPr>
           <a:lstStyle/>
           <a:p>
-            <a:pPr marL="342900" indent="-342900">
-              <a:buFontTx/>
-              <a:buChar char="-"/>
-            </a:pPr>
-            <a:r>
-              <a:rPr lang="fr-FR" dirty="0"/>
-              <a:t>Comprendre l’architecture du projet</a:t>
-            </a:r>
-          </a:p>
-          <a:p>
-            <a:pPr marL="342900" indent="-342900">
-              <a:buFontTx/>
-              <a:buChar char="-"/>
-            </a:pPr>
-            <a:r>
-              <a:rPr lang="fr-FR" dirty="0"/>
-              <a:t>S’approprier des scripts</a:t>
-            </a:r>
-          </a:p>
-          <a:p>
-            <a:pPr marL="342900" indent="-342900">
-              <a:buFontTx/>
-              <a:buChar char="-"/>
-            </a:pPr>
             <a:endParaRPr lang="fr-FR" dirty="0"/>
           </a:p>
         </p:txBody>
@@ -16133,7 +16307,7 @@
           <p:cNvPr id="6" name="Espace réservé du numéro de diapositive 5">
             <a:extLst>
               <a:ext uri="{FF2B5EF4-FFF2-40B4-BE49-F238E27FC236}">
-                <a16:creationId xmlns:a16="http://schemas.microsoft.com/office/drawing/2014/main" id="{C8FF65BA-EF36-A08A-A9D9-177DBD2CD342}"/>
+                <a16:creationId xmlns:a16="http://schemas.microsoft.com/office/drawing/2014/main" id="{F8E500CC-BD43-E2CE-8E3F-24DF377B5919}"/>
               </a:ext>
             </a:extLst>
           </p:cNvPr>
@@ -16160,7 +16334,7 @@
     </p:spTree>
     <p:extLst>
       <p:ext uri="{BB962C8B-B14F-4D97-AF65-F5344CB8AC3E}">
-        <p14:creationId xmlns:p14="http://schemas.microsoft.com/office/powerpoint/2010/main" val="2184707159"/>
+        <p14:creationId xmlns:p14="http://schemas.microsoft.com/office/powerpoint/2010/main" val="2180545974"/>
       </p:ext>
     </p:extLst>
   </p:cSld>

</xml_diff>